<commit_message>
I added DAQ && Trigger.
</commit_message>
<xml_diff>
--- a/01BacsiConceptsInNuclearPhysics.pptx
+++ b/01BacsiConceptsInNuclearPhysics.pptx
@@ -6,10 +6,10 @@
   </p:sldMasterIdLst>
   <p:sldIdLst>
     <p:sldId id="256" r:id="rId2"/>
-    <p:sldId id="257" r:id="rId3"/>
-    <p:sldId id="258" r:id="rId4"/>
-    <p:sldId id="259" r:id="rId5"/>
-    <p:sldId id="260" r:id="rId6"/>
+    <p:sldId id="259" r:id="rId3"/>
+    <p:sldId id="260" r:id="rId4"/>
+    <p:sldId id="261" r:id="rId5"/>
+    <p:sldId id="262" r:id="rId6"/>
   </p:sldIdLst>
   <p:sldSz cx="12192000" cy="6858000"/>
   <p:notesSz cx="6858000" cy="9144000"/>
@@ -108,6 +108,11 @@
       </a:defRPr>
     </a:lvl9pPr>
   </p:defaultTextStyle>
+  <p:extLst>
+    <p:ext uri="{EFAFB233-063F-42B5-8137-9DF3F51BA10A}">
+      <p15:sldGuideLst xmlns:p15="http://schemas.microsoft.com/office/powerpoint/2012/main"/>
+    </p:ext>
+  </p:extLst>
 </p:presentation>
 </file>
 
@@ -2976,8 +2981,8 @@
         </p:nvSpPr>
         <p:spPr>
           <a:xfrm>
-            <a:off x="296268" y="278859"/>
-            <a:ext cx="3056021" cy="646331"/>
+            <a:off x="272205" y="294901"/>
+            <a:ext cx="6338994" cy="646331"/>
           </a:xfrm>
           <a:prstGeom prst="rect">
             <a:avLst/>
@@ -3001,7 +3006,7 @@
                   <a:srgbClr val="FF0000"/>
                 </a:solidFill>
               </a:rPr>
-              <a:t>Date:</a:t>
+              <a:t>Date: 2018-10-15</a:t>
             </a:r>
           </a:p>
           <a:p>
@@ -3011,7 +3016,7 @@
                   <a:srgbClr val="FF0000"/>
                 </a:solidFill>
               </a:rPr>
-              <a:t>Source:</a:t>
+              <a:t>Source: google &lt;Triggering in Particle Physics Experiments&gt;</a:t>
             </a:r>
             <a:endParaRPr lang="zh-CN" altLang="en-US" dirty="0">
               <a:solidFill>
@@ -3021,6 +3026,36 @@
           </a:p>
         </p:txBody>
       </p:sp>
+      <p:pic>
+        <p:nvPicPr>
+          <p:cNvPr id="2" name="图片 1"/>
+          <p:cNvPicPr>
+            <a:picLocks noChangeAspect="1"/>
+          </p:cNvPicPr>
+          <p:nvPr/>
+        </p:nvPicPr>
+        <p:blipFill>
+          <a:blip r:embed="rId2">
+            <a:extLst>
+              <a:ext uri="{28A0092B-C50C-407E-A947-70E740481C1C}">
+                <a14:useLocalDpi xmlns:a14="http://schemas.microsoft.com/office/drawing/2010/main" val="0"/>
+              </a:ext>
+            </a:extLst>
+          </a:blip>
+          <a:stretch>
+            <a:fillRect/>
+          </a:stretch>
+        </p:blipFill>
+        <p:spPr>
+          <a:xfrm>
+            <a:off x="1394105" y="1385991"/>
+            <a:ext cx="8184589" cy="5159187"/>
+          </a:xfrm>
+          <a:prstGeom prst="rect">
+            <a:avLst/>
+          </a:prstGeom>
+        </p:spPr>
+      </p:pic>
     </p:spTree>
     <p:extLst>
       <p:ext uri="{BB962C8B-B14F-4D97-AF65-F5344CB8AC3E}">
@@ -3060,7 +3095,7 @@
         <p:spPr>
           <a:xfrm>
             <a:off x="296268" y="278859"/>
-            <a:ext cx="3056021" cy="646331"/>
+            <a:ext cx="8191240" cy="646331"/>
           </a:xfrm>
           <a:prstGeom prst="rect">
             <a:avLst/>
@@ -3084,7 +3119,7 @@
                   <a:srgbClr val="FF0000"/>
                 </a:solidFill>
               </a:rPr>
-              <a:t>Date:</a:t>
+              <a:t>Date: 2018-10-15</a:t>
             </a:r>
           </a:p>
           <a:p>
@@ -3094,7 +3129,7 @@
                   <a:srgbClr val="FF0000"/>
                 </a:solidFill>
               </a:rPr>
-              <a:t>Source:</a:t>
+              <a:t>Source: CAEN &lt;Digital Pulse Processing in Nuclear Physics&gt;</a:t>
             </a:r>
             <a:endParaRPr lang="zh-CN" altLang="en-US" dirty="0">
               <a:solidFill>
@@ -3107,7 +3142,7 @@
     </p:spTree>
     <p:extLst>
       <p:ext uri="{BB962C8B-B14F-4D97-AF65-F5344CB8AC3E}">
-        <p14:creationId xmlns:p14="http://schemas.microsoft.com/office/powerpoint/2010/main" val="2334899085"/>
+        <p14:creationId xmlns:p14="http://schemas.microsoft.com/office/powerpoint/2010/main" val="1639705202"/>
       </p:ext>
     </p:extLst>
   </p:cSld>
@@ -3190,7 +3225,7 @@
     </p:spTree>
     <p:extLst>
       <p:ext uri="{BB962C8B-B14F-4D97-AF65-F5344CB8AC3E}">
-        <p14:creationId xmlns:p14="http://schemas.microsoft.com/office/powerpoint/2010/main" val="2669468979"/>
+        <p14:creationId xmlns:p14="http://schemas.microsoft.com/office/powerpoint/2010/main" val="3488402378"/>
       </p:ext>
     </p:extLst>
   </p:cSld>
@@ -3217,63 +3252,10 @@
           <a:chExt cx="0" cy="0"/>
         </a:xfrm>
       </p:grpSpPr>
-      <p:sp>
-        <p:nvSpPr>
-          <p:cNvPr id="4" name="文本框 3"/>
-          <p:cNvSpPr txBox="1"/>
-          <p:nvPr/>
-        </p:nvSpPr>
-        <p:spPr>
-          <a:xfrm>
-            <a:off x="296268" y="278859"/>
-            <a:ext cx="3056021" cy="646331"/>
-          </a:xfrm>
-          <a:prstGeom prst="rect">
-            <a:avLst/>
-          </a:prstGeom>
-          <a:noFill/>
-          <a:ln w="25400">
-            <a:solidFill>
-              <a:srgbClr val="FF0000"/>
-            </a:solidFill>
-          </a:ln>
-        </p:spPr>
-        <p:txBody>
-          <a:bodyPr wrap="square" rtlCol="0">
-            <a:spAutoFit/>
-          </a:bodyPr>
-          <a:lstStyle/>
-          <a:p>
-            <a:r>
-              <a:rPr lang="en-US" altLang="zh-CN" dirty="0" smtClean="0">
-                <a:solidFill>
-                  <a:srgbClr val="FF0000"/>
-                </a:solidFill>
-              </a:rPr>
-              <a:t>Date:</a:t>
-            </a:r>
-          </a:p>
-          <a:p>
-            <a:r>
-              <a:rPr lang="en-US" altLang="zh-CN" dirty="0" smtClean="0">
-                <a:solidFill>
-                  <a:srgbClr val="FF0000"/>
-                </a:solidFill>
-              </a:rPr>
-              <a:t>Source:</a:t>
-            </a:r>
-            <a:endParaRPr lang="zh-CN" altLang="en-US" dirty="0">
-              <a:solidFill>
-                <a:srgbClr val="FF0000"/>
-              </a:solidFill>
-            </a:endParaRPr>
-          </a:p>
-        </p:txBody>
-      </p:sp>
     </p:spTree>
     <p:extLst>
       <p:ext uri="{BB962C8B-B14F-4D97-AF65-F5344CB8AC3E}">
-        <p14:creationId xmlns:p14="http://schemas.microsoft.com/office/powerpoint/2010/main" val="1639705202"/>
+        <p14:creationId xmlns:p14="http://schemas.microsoft.com/office/powerpoint/2010/main" val="1832017264"/>
       </p:ext>
     </p:extLst>
   </p:cSld>
@@ -3300,63 +3282,10 @@
           <a:chExt cx="0" cy="0"/>
         </a:xfrm>
       </p:grpSpPr>
-      <p:sp>
-        <p:nvSpPr>
-          <p:cNvPr id="4" name="文本框 3"/>
-          <p:cNvSpPr txBox="1"/>
-          <p:nvPr/>
-        </p:nvSpPr>
-        <p:spPr>
-          <a:xfrm>
-            <a:off x="296268" y="278859"/>
-            <a:ext cx="3056021" cy="646331"/>
-          </a:xfrm>
-          <a:prstGeom prst="rect">
-            <a:avLst/>
-          </a:prstGeom>
-          <a:noFill/>
-          <a:ln w="25400">
-            <a:solidFill>
-              <a:srgbClr val="FF0000"/>
-            </a:solidFill>
-          </a:ln>
-        </p:spPr>
-        <p:txBody>
-          <a:bodyPr wrap="square" rtlCol="0">
-            <a:spAutoFit/>
-          </a:bodyPr>
-          <a:lstStyle/>
-          <a:p>
-            <a:r>
-              <a:rPr lang="en-US" altLang="zh-CN" dirty="0" smtClean="0">
-                <a:solidFill>
-                  <a:srgbClr val="FF0000"/>
-                </a:solidFill>
-              </a:rPr>
-              <a:t>Date:</a:t>
-            </a:r>
-          </a:p>
-          <a:p>
-            <a:r>
-              <a:rPr lang="en-US" altLang="zh-CN" dirty="0" smtClean="0">
-                <a:solidFill>
-                  <a:srgbClr val="FF0000"/>
-                </a:solidFill>
-              </a:rPr>
-              <a:t>Source:</a:t>
-            </a:r>
-            <a:endParaRPr lang="zh-CN" altLang="en-US" dirty="0">
-              <a:solidFill>
-                <a:srgbClr val="FF0000"/>
-              </a:solidFill>
-            </a:endParaRPr>
-          </a:p>
-        </p:txBody>
-      </p:sp>
     </p:spTree>
     <p:extLst>
       <p:ext uri="{BB962C8B-B14F-4D97-AF65-F5344CB8AC3E}">
-        <p14:creationId xmlns:p14="http://schemas.microsoft.com/office/powerpoint/2010/main" val="3488402378"/>
+        <p14:creationId xmlns:p14="http://schemas.microsoft.com/office/powerpoint/2010/main" val="1102873507"/>
       </p:ext>
     </p:extLst>
   </p:cSld>

</xml_diff>

<commit_message>
What is an event, an entry, and multiplicity?
</commit_message>
<xml_diff>
--- a/01BacsiConceptsInNuclearPhysics.pptx
+++ b/01BacsiConceptsInNuclearPhysics.pptx
@@ -5,11 +5,11 @@
     <p:sldMasterId id="2147483648" r:id="rId1"/>
   </p:sldMasterIdLst>
   <p:sldIdLst>
-    <p:sldId id="256" r:id="rId2"/>
-    <p:sldId id="259" r:id="rId3"/>
-    <p:sldId id="260" r:id="rId4"/>
-    <p:sldId id="261" r:id="rId5"/>
-    <p:sldId id="262" r:id="rId6"/>
+    <p:sldId id="262" r:id="rId2"/>
+    <p:sldId id="261" r:id="rId3"/>
+    <p:sldId id="256" r:id="rId4"/>
+    <p:sldId id="259" r:id="rId5"/>
+    <p:sldId id="260" r:id="rId6"/>
   </p:sldIdLst>
   <p:sldSz cx="12192000" cy="6858000"/>
   <p:notesSz cx="6858000" cy="9144000"/>
@@ -247,7 +247,7 @@
           <a:p>
             <a:fld id="{671484C7-CE74-40BE-9A81-F48CEFF7399F}" type="datetimeFigureOut">
               <a:rPr lang="zh-CN" altLang="en-US" smtClean="0"/>
-              <a:t>2018/10/17</a:t>
+              <a:t>2018/10/30</a:t>
             </a:fld>
             <a:endParaRPr lang="zh-CN" altLang="en-US"/>
           </a:p>
@@ -417,7 +417,7 @@
           <a:p>
             <a:fld id="{671484C7-CE74-40BE-9A81-F48CEFF7399F}" type="datetimeFigureOut">
               <a:rPr lang="zh-CN" altLang="en-US" smtClean="0"/>
-              <a:t>2018/10/17</a:t>
+              <a:t>2018/10/30</a:t>
             </a:fld>
             <a:endParaRPr lang="zh-CN" altLang="en-US"/>
           </a:p>
@@ -597,7 +597,7 @@
           <a:p>
             <a:fld id="{671484C7-CE74-40BE-9A81-F48CEFF7399F}" type="datetimeFigureOut">
               <a:rPr lang="zh-CN" altLang="en-US" smtClean="0"/>
-              <a:t>2018/10/17</a:t>
+              <a:t>2018/10/30</a:t>
             </a:fld>
             <a:endParaRPr lang="zh-CN" altLang="en-US"/>
           </a:p>
@@ -767,7 +767,7 @@
           <a:p>
             <a:fld id="{671484C7-CE74-40BE-9A81-F48CEFF7399F}" type="datetimeFigureOut">
               <a:rPr lang="zh-CN" altLang="en-US" smtClean="0"/>
-              <a:t>2018/10/17</a:t>
+              <a:t>2018/10/30</a:t>
             </a:fld>
             <a:endParaRPr lang="zh-CN" altLang="en-US"/>
           </a:p>
@@ -1013,7 +1013,7 @@
           <a:p>
             <a:fld id="{671484C7-CE74-40BE-9A81-F48CEFF7399F}" type="datetimeFigureOut">
               <a:rPr lang="zh-CN" altLang="en-US" smtClean="0"/>
-              <a:t>2018/10/17</a:t>
+              <a:t>2018/10/30</a:t>
             </a:fld>
             <a:endParaRPr lang="zh-CN" altLang="en-US"/>
           </a:p>
@@ -1245,7 +1245,7 @@
           <a:p>
             <a:fld id="{671484C7-CE74-40BE-9A81-F48CEFF7399F}" type="datetimeFigureOut">
               <a:rPr lang="zh-CN" altLang="en-US" smtClean="0"/>
-              <a:t>2018/10/17</a:t>
+              <a:t>2018/10/30</a:t>
             </a:fld>
             <a:endParaRPr lang="zh-CN" altLang="en-US"/>
           </a:p>
@@ -1612,7 +1612,7 @@
           <a:p>
             <a:fld id="{671484C7-CE74-40BE-9A81-F48CEFF7399F}" type="datetimeFigureOut">
               <a:rPr lang="zh-CN" altLang="en-US" smtClean="0"/>
-              <a:t>2018/10/17</a:t>
+              <a:t>2018/10/30</a:t>
             </a:fld>
             <a:endParaRPr lang="zh-CN" altLang="en-US"/>
           </a:p>
@@ -1730,7 +1730,7 @@
           <a:p>
             <a:fld id="{671484C7-CE74-40BE-9A81-F48CEFF7399F}" type="datetimeFigureOut">
               <a:rPr lang="zh-CN" altLang="en-US" smtClean="0"/>
-              <a:t>2018/10/17</a:t>
+              <a:t>2018/10/30</a:t>
             </a:fld>
             <a:endParaRPr lang="zh-CN" altLang="en-US"/>
           </a:p>
@@ -1825,7 +1825,7 @@
           <a:p>
             <a:fld id="{671484C7-CE74-40BE-9A81-F48CEFF7399F}" type="datetimeFigureOut">
               <a:rPr lang="zh-CN" altLang="en-US" smtClean="0"/>
-              <a:t>2018/10/17</a:t>
+              <a:t>2018/10/30</a:t>
             </a:fld>
             <a:endParaRPr lang="zh-CN" altLang="en-US"/>
           </a:p>
@@ -2102,7 +2102,7 @@
           <a:p>
             <a:fld id="{671484C7-CE74-40BE-9A81-F48CEFF7399F}" type="datetimeFigureOut">
               <a:rPr lang="zh-CN" altLang="en-US" smtClean="0"/>
-              <a:t>2018/10/17</a:t>
+              <a:t>2018/10/30</a:t>
             </a:fld>
             <a:endParaRPr lang="zh-CN" altLang="en-US"/>
           </a:p>
@@ -2355,7 +2355,7 @@
           <a:p>
             <a:fld id="{671484C7-CE74-40BE-9A81-F48CEFF7399F}" type="datetimeFigureOut">
               <a:rPr lang="zh-CN" altLang="en-US" smtClean="0"/>
-              <a:t>2018/10/17</a:t>
+              <a:t>2018/10/30</a:t>
             </a:fld>
             <a:endParaRPr lang="zh-CN" altLang="en-US"/>
           </a:p>
@@ -2568,7 +2568,7 @@
           <a:p>
             <a:fld id="{671484C7-CE74-40BE-9A81-F48CEFF7399F}" type="datetimeFigureOut">
               <a:rPr lang="zh-CN" altLang="en-US" smtClean="0"/>
-              <a:t>2018/10/17</a:t>
+              <a:t>2018/10/30</a:t>
             </a:fld>
             <a:endParaRPr lang="zh-CN" altLang="en-US"/>
           </a:p>
@@ -2975,6 +2975,96 @@
       </p:grpSpPr>
       <p:sp>
         <p:nvSpPr>
+          <p:cNvPr id="2" name="TextBox 1"/>
+          <p:cNvSpPr txBox="1"/>
+          <p:nvPr/>
+        </p:nvSpPr>
+        <p:spPr>
+          <a:xfrm>
+            <a:off x="286870" y="268941"/>
+            <a:ext cx="7718612" cy="369332"/>
+          </a:xfrm>
+          <a:prstGeom prst="rect">
+            <a:avLst/>
+          </a:prstGeom>
+          <a:noFill/>
+        </p:spPr>
+        <p:txBody>
+          <a:bodyPr wrap="square" rtlCol="0">
+            <a:spAutoFit/>
+          </a:bodyPr>
+          <a:lstStyle/>
+          <a:p>
+            <a:r>
+              <a:rPr lang="en-US" dirty="0" smtClean="0"/>
+              <a:t>Q1: What is an event? What is an entry? What is multiplicity?</a:t>
+            </a:r>
+            <a:endParaRPr lang="en-US" dirty="0"/>
+          </a:p>
+        </p:txBody>
+      </p:sp>
+    </p:spTree>
+    <p:extLst>
+      <p:ext uri="{BB962C8B-B14F-4D97-AF65-F5344CB8AC3E}">
+        <p14:creationId xmlns:p14="http://schemas.microsoft.com/office/powerpoint/2010/main" val="1102873507"/>
+      </p:ext>
+    </p:extLst>
+  </p:cSld>
+  <p:clrMapOvr>
+    <a:masterClrMapping/>
+  </p:clrMapOvr>
+</p:sld>
+</file>
+
+<file path=ppt/slides/slide2.xml><?xml version="1.0" encoding="utf-8"?>
+<p:sld xmlns:a="http://schemas.openxmlformats.org/drawingml/2006/main" xmlns:r="http://schemas.openxmlformats.org/officeDocument/2006/relationships" xmlns:p="http://schemas.openxmlformats.org/presentationml/2006/main">
+  <p:cSld>
+    <p:spTree>
+      <p:nvGrpSpPr>
+        <p:cNvPr id="1" name=""/>
+        <p:cNvGrpSpPr/>
+        <p:nvPr/>
+      </p:nvGrpSpPr>
+      <p:grpSpPr>
+        <a:xfrm>
+          <a:off x="0" y="0"/>
+          <a:ext cx="0" cy="0"/>
+          <a:chOff x="0" y="0"/>
+          <a:chExt cx="0" cy="0"/>
+        </a:xfrm>
+      </p:grpSpPr>
+    </p:spTree>
+    <p:extLst>
+      <p:ext uri="{BB962C8B-B14F-4D97-AF65-F5344CB8AC3E}">
+        <p14:creationId xmlns:p14="http://schemas.microsoft.com/office/powerpoint/2010/main" val="1832017264"/>
+      </p:ext>
+    </p:extLst>
+  </p:cSld>
+  <p:clrMapOvr>
+    <a:masterClrMapping/>
+  </p:clrMapOvr>
+</p:sld>
+</file>
+
+<file path=ppt/slides/slide3.xml><?xml version="1.0" encoding="utf-8"?>
+<p:sld xmlns:a="http://schemas.openxmlformats.org/drawingml/2006/main" xmlns:r="http://schemas.openxmlformats.org/officeDocument/2006/relationships" xmlns:p="http://schemas.openxmlformats.org/presentationml/2006/main">
+  <p:cSld>
+    <p:spTree>
+      <p:nvGrpSpPr>
+        <p:cNvPr id="1" name=""/>
+        <p:cNvGrpSpPr/>
+        <p:nvPr/>
+      </p:nvGrpSpPr>
+      <p:grpSpPr>
+        <a:xfrm>
+          <a:off x="0" y="0"/>
+          <a:ext cx="0" cy="0"/>
+          <a:chOff x="0" y="0"/>
+          <a:chExt cx="0" cy="0"/>
+        </a:xfrm>
+      </p:grpSpPr>
+      <p:sp>
+        <p:nvSpPr>
           <p:cNvPr id="4" name="文本框 3"/>
           <p:cNvSpPr txBox="1"/>
           <p:nvPr/>
@@ -3069,172 +3159,6 @@
 </p:sld>
 </file>
 
-<file path=ppt/slides/slide2.xml><?xml version="1.0" encoding="utf-8"?>
-<p:sld xmlns:a="http://schemas.openxmlformats.org/drawingml/2006/main" xmlns:r="http://schemas.openxmlformats.org/officeDocument/2006/relationships" xmlns:p="http://schemas.openxmlformats.org/presentationml/2006/main">
-  <p:cSld>
-    <p:spTree>
-      <p:nvGrpSpPr>
-        <p:cNvPr id="1" name=""/>
-        <p:cNvGrpSpPr/>
-        <p:nvPr/>
-      </p:nvGrpSpPr>
-      <p:grpSpPr>
-        <a:xfrm>
-          <a:off x="0" y="0"/>
-          <a:ext cx="0" cy="0"/>
-          <a:chOff x="0" y="0"/>
-          <a:chExt cx="0" cy="0"/>
-        </a:xfrm>
-      </p:grpSpPr>
-      <p:sp>
-        <p:nvSpPr>
-          <p:cNvPr id="4" name="文本框 3"/>
-          <p:cNvSpPr txBox="1"/>
-          <p:nvPr/>
-        </p:nvSpPr>
-        <p:spPr>
-          <a:xfrm>
-            <a:off x="296268" y="278859"/>
-            <a:ext cx="8191240" cy="646331"/>
-          </a:xfrm>
-          <a:prstGeom prst="rect">
-            <a:avLst/>
-          </a:prstGeom>
-          <a:noFill/>
-          <a:ln w="25400">
-            <a:solidFill>
-              <a:srgbClr val="FF0000"/>
-            </a:solidFill>
-          </a:ln>
-        </p:spPr>
-        <p:txBody>
-          <a:bodyPr wrap="square" rtlCol="0">
-            <a:spAutoFit/>
-          </a:bodyPr>
-          <a:lstStyle/>
-          <a:p>
-            <a:r>
-              <a:rPr lang="en-US" altLang="zh-CN" dirty="0" smtClean="0">
-                <a:solidFill>
-                  <a:srgbClr val="FF0000"/>
-                </a:solidFill>
-              </a:rPr>
-              <a:t>Date: 2018-10-15</a:t>
-            </a:r>
-          </a:p>
-          <a:p>
-            <a:r>
-              <a:rPr lang="en-US" altLang="zh-CN" dirty="0" smtClean="0">
-                <a:solidFill>
-                  <a:srgbClr val="FF0000"/>
-                </a:solidFill>
-              </a:rPr>
-              <a:t>Source: CAEN &lt;Digital Pulse Processing in Nuclear Physics&gt;</a:t>
-            </a:r>
-            <a:endParaRPr lang="zh-CN" altLang="en-US" dirty="0">
-              <a:solidFill>
-                <a:srgbClr val="FF0000"/>
-              </a:solidFill>
-            </a:endParaRPr>
-          </a:p>
-        </p:txBody>
-      </p:sp>
-    </p:spTree>
-    <p:extLst>
-      <p:ext uri="{BB962C8B-B14F-4D97-AF65-F5344CB8AC3E}">
-        <p14:creationId xmlns:p14="http://schemas.microsoft.com/office/powerpoint/2010/main" val="1639705202"/>
-      </p:ext>
-    </p:extLst>
-  </p:cSld>
-  <p:clrMapOvr>
-    <a:masterClrMapping/>
-  </p:clrMapOvr>
-</p:sld>
-</file>
-
-<file path=ppt/slides/slide3.xml><?xml version="1.0" encoding="utf-8"?>
-<p:sld xmlns:a="http://schemas.openxmlformats.org/drawingml/2006/main" xmlns:r="http://schemas.openxmlformats.org/officeDocument/2006/relationships" xmlns:p="http://schemas.openxmlformats.org/presentationml/2006/main">
-  <p:cSld>
-    <p:spTree>
-      <p:nvGrpSpPr>
-        <p:cNvPr id="1" name=""/>
-        <p:cNvGrpSpPr/>
-        <p:nvPr/>
-      </p:nvGrpSpPr>
-      <p:grpSpPr>
-        <a:xfrm>
-          <a:off x="0" y="0"/>
-          <a:ext cx="0" cy="0"/>
-          <a:chOff x="0" y="0"/>
-          <a:chExt cx="0" cy="0"/>
-        </a:xfrm>
-      </p:grpSpPr>
-      <p:sp>
-        <p:nvSpPr>
-          <p:cNvPr id="4" name="文本框 3"/>
-          <p:cNvSpPr txBox="1"/>
-          <p:nvPr/>
-        </p:nvSpPr>
-        <p:spPr>
-          <a:xfrm>
-            <a:off x="296268" y="278859"/>
-            <a:ext cx="3056021" cy="646331"/>
-          </a:xfrm>
-          <a:prstGeom prst="rect">
-            <a:avLst/>
-          </a:prstGeom>
-          <a:noFill/>
-          <a:ln w="25400">
-            <a:solidFill>
-              <a:srgbClr val="FF0000"/>
-            </a:solidFill>
-          </a:ln>
-        </p:spPr>
-        <p:txBody>
-          <a:bodyPr wrap="square" rtlCol="0">
-            <a:spAutoFit/>
-          </a:bodyPr>
-          <a:lstStyle/>
-          <a:p>
-            <a:r>
-              <a:rPr lang="en-US" altLang="zh-CN" dirty="0" smtClean="0">
-                <a:solidFill>
-                  <a:srgbClr val="FF0000"/>
-                </a:solidFill>
-              </a:rPr>
-              <a:t>Date:</a:t>
-            </a:r>
-          </a:p>
-          <a:p>
-            <a:r>
-              <a:rPr lang="en-US" altLang="zh-CN" dirty="0" smtClean="0">
-                <a:solidFill>
-                  <a:srgbClr val="FF0000"/>
-                </a:solidFill>
-              </a:rPr>
-              <a:t>Source:</a:t>
-            </a:r>
-            <a:endParaRPr lang="zh-CN" altLang="en-US" dirty="0">
-              <a:solidFill>
-                <a:srgbClr val="FF0000"/>
-              </a:solidFill>
-            </a:endParaRPr>
-          </a:p>
-        </p:txBody>
-      </p:sp>
-    </p:spTree>
-    <p:extLst>
-      <p:ext uri="{BB962C8B-B14F-4D97-AF65-F5344CB8AC3E}">
-        <p14:creationId xmlns:p14="http://schemas.microsoft.com/office/powerpoint/2010/main" val="3488402378"/>
-      </p:ext>
-    </p:extLst>
-  </p:cSld>
-  <p:clrMapOvr>
-    <a:masterClrMapping/>
-  </p:clrMapOvr>
-</p:sld>
-</file>
-
 <file path=ppt/slides/slide4.xml><?xml version="1.0" encoding="utf-8"?>
 <p:sld xmlns:a="http://schemas.openxmlformats.org/drawingml/2006/main" xmlns:r="http://schemas.openxmlformats.org/officeDocument/2006/relationships" xmlns:p="http://schemas.openxmlformats.org/presentationml/2006/main">
   <p:cSld>
@@ -3252,10 +3176,71 @@
           <a:chExt cx="0" cy="0"/>
         </a:xfrm>
       </p:grpSpPr>
+      <p:sp>
+        <p:nvSpPr>
+          <p:cNvPr id="4" name="文本框 3"/>
+          <p:cNvSpPr txBox="1"/>
+          <p:nvPr/>
+        </p:nvSpPr>
+        <p:spPr>
+          <a:xfrm>
+            <a:off x="296268" y="278859"/>
+            <a:ext cx="8191240" cy="646331"/>
+          </a:xfrm>
+          <a:prstGeom prst="rect">
+            <a:avLst/>
+          </a:prstGeom>
+          <a:noFill/>
+          <a:ln w="25400">
+            <a:solidFill>
+              <a:srgbClr val="FF0000"/>
+            </a:solidFill>
+          </a:ln>
+        </p:spPr>
+        <p:txBody>
+          <a:bodyPr wrap="square" rtlCol="0">
+            <a:spAutoFit/>
+          </a:bodyPr>
+          <a:lstStyle/>
+          <a:p>
+            <a:r>
+              <a:rPr lang="en-US" altLang="zh-CN" dirty="0" smtClean="0">
+                <a:solidFill>
+                  <a:srgbClr val="FF0000"/>
+                </a:solidFill>
+              </a:rPr>
+              <a:t>Date: 2018-10-15</a:t>
+            </a:r>
+          </a:p>
+          <a:p>
+            <a:r>
+              <a:rPr lang="en-US" altLang="zh-CN" dirty="0" smtClean="0">
+                <a:solidFill>
+                  <a:srgbClr val="FF0000"/>
+                </a:solidFill>
+              </a:rPr>
+              <a:t>Source</a:t>
+            </a:r>
+            <a:r>
+              <a:rPr lang="en-US" altLang="zh-CN" dirty="0" smtClean="0">
+                <a:solidFill>
+                  <a:srgbClr val="FF0000"/>
+                </a:solidFill>
+              </a:rPr>
+              <a:t>:</a:t>
+            </a:r>
+            <a:endParaRPr lang="zh-CN" altLang="en-US" dirty="0">
+              <a:solidFill>
+                <a:srgbClr val="FF0000"/>
+              </a:solidFill>
+            </a:endParaRPr>
+          </a:p>
+        </p:txBody>
+      </p:sp>
     </p:spTree>
     <p:extLst>
       <p:ext uri="{BB962C8B-B14F-4D97-AF65-F5344CB8AC3E}">
-        <p14:creationId xmlns:p14="http://schemas.microsoft.com/office/powerpoint/2010/main" val="1832017264"/>
+        <p14:creationId xmlns:p14="http://schemas.microsoft.com/office/powerpoint/2010/main" val="1639705202"/>
       </p:ext>
     </p:extLst>
   </p:cSld>
@@ -3282,10 +3267,63 @@
           <a:chExt cx="0" cy="0"/>
         </a:xfrm>
       </p:grpSpPr>
+      <p:sp>
+        <p:nvSpPr>
+          <p:cNvPr id="4" name="文本框 3"/>
+          <p:cNvSpPr txBox="1"/>
+          <p:nvPr/>
+        </p:nvSpPr>
+        <p:spPr>
+          <a:xfrm>
+            <a:off x="296268" y="278859"/>
+            <a:ext cx="3056021" cy="646331"/>
+          </a:xfrm>
+          <a:prstGeom prst="rect">
+            <a:avLst/>
+          </a:prstGeom>
+          <a:noFill/>
+          <a:ln w="25400">
+            <a:solidFill>
+              <a:srgbClr val="FF0000"/>
+            </a:solidFill>
+          </a:ln>
+        </p:spPr>
+        <p:txBody>
+          <a:bodyPr wrap="square" rtlCol="0">
+            <a:spAutoFit/>
+          </a:bodyPr>
+          <a:lstStyle/>
+          <a:p>
+            <a:r>
+              <a:rPr lang="en-US" altLang="zh-CN" dirty="0" smtClean="0">
+                <a:solidFill>
+                  <a:srgbClr val="FF0000"/>
+                </a:solidFill>
+              </a:rPr>
+              <a:t>Date:</a:t>
+            </a:r>
+          </a:p>
+          <a:p>
+            <a:r>
+              <a:rPr lang="en-US" altLang="zh-CN" dirty="0" smtClean="0">
+                <a:solidFill>
+                  <a:srgbClr val="FF0000"/>
+                </a:solidFill>
+              </a:rPr>
+              <a:t>Source:</a:t>
+            </a:r>
+            <a:endParaRPr lang="zh-CN" altLang="en-US" dirty="0">
+              <a:solidFill>
+                <a:srgbClr val="FF0000"/>
+              </a:solidFill>
+            </a:endParaRPr>
+          </a:p>
+        </p:txBody>
+      </p:sp>
     </p:spTree>
     <p:extLst>
       <p:ext uri="{BB962C8B-B14F-4D97-AF65-F5344CB8AC3E}">
-        <p14:creationId xmlns:p14="http://schemas.microsoft.com/office/powerpoint/2010/main" val="1102873507"/>
+        <p14:creationId xmlns:p14="http://schemas.microsoft.com/office/powerpoint/2010/main" val="3488402378"/>
       </p:ext>
     </p:extLst>
   </p:cSld>

</xml_diff>